<commit_message>
Edited presentation, added eval results
</commit_message>
<xml_diff>
--- a/cocktails.pptx
+++ b/cocktails.pptx
@@ -7,10 +7,10 @@
     <p:sldMasterId id="2147483708" r:id="rId3"/>
   </p:sldMasterIdLst>
   <p:notesMasterIdLst>
-    <p:notesMasterId r:id="rId18"/>
+    <p:notesMasterId r:id="rId20"/>
   </p:notesMasterIdLst>
   <p:handoutMasterIdLst>
-    <p:handoutMasterId r:id="rId19"/>
+    <p:handoutMasterId r:id="rId21"/>
   </p:handoutMasterIdLst>
   <p:sldIdLst>
     <p:sldId id="259" r:id="rId4"/>
@@ -26,7 +26,9 @@
     <p:sldId id="265" r:id="rId14"/>
     <p:sldId id="266" r:id="rId15"/>
     <p:sldId id="267" r:id="rId16"/>
-    <p:sldId id="268" r:id="rId17"/>
+    <p:sldId id="274" r:id="rId17"/>
+    <p:sldId id="275" r:id="rId18"/>
+    <p:sldId id="268" r:id="rId19"/>
   </p:sldIdLst>
   <p:sldSz cx="9144000" cy="6858000" type="screen4x3"/>
   <p:notesSz cx="6858000" cy="9144000"/>
@@ -127,7 +129,7 @@
   </p:defaultTextStyle>
   <p:extLst>
     <p:ext uri="{EFAFB233-063F-42B5-8137-9DF3F51BA10A}">
-      <p15:sldGuideLst xmlns:p15="http://schemas.microsoft.com/office/powerpoint/2012/main" xmlns="">
+      <p15:sldGuideLst xmlns:p15="http://schemas.microsoft.com/office/powerpoint/2012/main">
         <p15:guide id="1" orient="horz" pos="2160">
           <p15:clr>
             <a:srgbClr val="A4A3A4"/>
@@ -141,7 +143,7 @@
       </p15:sldGuideLst>
     </p:ext>
     <p:ext uri="{2D200454-40CA-4A62-9FC3-DE9A4176ACB9}">
-      <p15:notesGuideLst xmlns:p15="http://schemas.microsoft.com/office/powerpoint/2012/main" xmlns="">
+      <p15:notesGuideLst xmlns:p15="http://schemas.microsoft.com/office/powerpoint/2012/main">
         <p15:guide id="1" orient="horz" pos="2880">
           <p15:clr>
             <a:srgbClr val="A4A3A4"/>
@@ -762,6 +764,281 @@
 </p:notes>
 </file>
 
+<file path=ppt/notesSlides/notesSlide10.xml><?xml version="1.0" encoding="utf-8"?>
+<p:notes xmlns:a="http://schemas.openxmlformats.org/drawingml/2006/main" xmlns:r="http://schemas.openxmlformats.org/officeDocument/2006/relationships" xmlns:p="http://schemas.openxmlformats.org/presentationml/2006/main">
+  <p:cSld>
+    <p:spTree>
+      <p:nvGrpSpPr>
+        <p:cNvPr id="1" name=""/>
+        <p:cNvGrpSpPr/>
+        <p:nvPr/>
+      </p:nvGrpSpPr>
+      <p:grpSpPr>
+        <a:xfrm>
+          <a:off x="0" y="0"/>
+          <a:ext cx="0" cy="0"/>
+          <a:chOff x="0" y="0"/>
+          <a:chExt cx="0" cy="0"/>
+        </a:xfrm>
+      </p:grpSpPr>
+      <p:sp>
+        <p:nvSpPr>
+          <p:cNvPr id="2" name="Slide Image Placeholder 1"/>
+          <p:cNvSpPr>
+            <a:spLocks noGrp="1" noRot="1" noChangeAspect="1"/>
+          </p:cNvSpPr>
+          <p:nvPr>
+            <p:ph type="sldImg"/>
+          </p:nvPr>
+        </p:nvSpPr>
+        <p:spPr/>
+      </p:sp>
+      <p:sp>
+        <p:nvSpPr>
+          <p:cNvPr id="3" name="Notes Placeholder 2"/>
+          <p:cNvSpPr>
+            <a:spLocks noGrp="1"/>
+          </p:cNvSpPr>
+          <p:nvPr>
+            <p:ph type="body" idx="1"/>
+          </p:nvPr>
+        </p:nvSpPr>
+        <p:spPr/>
+        <p:txBody>
+          <a:bodyPr/>
+          <a:lstStyle/>
+          <a:p>
+            <a:r>
+              <a:rPr lang="en-US" dirty="0" smtClean="0"/>
+              <a:t>Little intersection among varying list sizes</a:t>
+            </a:r>
+            <a:endParaRPr lang="en-US" dirty="0"/>
+          </a:p>
+        </p:txBody>
+      </p:sp>
+      <p:sp>
+        <p:nvSpPr>
+          <p:cNvPr id="4" name="Slide Number Placeholder 3"/>
+          <p:cNvSpPr>
+            <a:spLocks noGrp="1"/>
+          </p:cNvSpPr>
+          <p:nvPr>
+            <p:ph type="sldNum" sz="quarter" idx="10"/>
+          </p:nvPr>
+        </p:nvSpPr>
+        <p:spPr/>
+        <p:txBody>
+          <a:bodyPr/>
+          <a:lstStyle/>
+          <a:p>
+            <a:fld id="{33EFAA6C-2AC7-4B7E-83E0-5928ADC34D0B}" type="slidenum">
+              <a:rPr lang="cs-CZ" smtClean="0"/>
+              <a:pPr/>
+              <a:t>13</a:t>
+            </a:fld>
+            <a:endParaRPr lang="cs-CZ"/>
+          </a:p>
+        </p:txBody>
+      </p:sp>
+    </p:spTree>
+    <p:extLst>
+      <p:ext uri="{BB962C8B-B14F-4D97-AF65-F5344CB8AC3E}">
+        <p14:creationId xmlns:p14="http://schemas.microsoft.com/office/powerpoint/2010/main" val="2545168670"/>
+      </p:ext>
+    </p:extLst>
+  </p:cSld>
+  <p:clrMapOvr>
+    <a:masterClrMapping/>
+  </p:clrMapOvr>
+</p:notes>
+</file>
+
+<file path=ppt/notesSlides/notesSlide11.xml><?xml version="1.0" encoding="utf-8"?>
+<p:notes xmlns:a="http://schemas.openxmlformats.org/drawingml/2006/main" xmlns:r="http://schemas.openxmlformats.org/officeDocument/2006/relationships" xmlns:p="http://schemas.openxmlformats.org/presentationml/2006/main">
+  <p:cSld>
+    <p:spTree>
+      <p:nvGrpSpPr>
+        <p:cNvPr id="1" name=""/>
+        <p:cNvGrpSpPr/>
+        <p:nvPr/>
+      </p:nvGrpSpPr>
+      <p:grpSpPr>
+        <a:xfrm>
+          <a:off x="0" y="0"/>
+          <a:ext cx="0" cy="0"/>
+          <a:chOff x="0" y="0"/>
+          <a:chExt cx="0" cy="0"/>
+        </a:xfrm>
+      </p:grpSpPr>
+      <p:sp>
+        <p:nvSpPr>
+          <p:cNvPr id="2" name="Slide Image Placeholder 1"/>
+          <p:cNvSpPr>
+            <a:spLocks noGrp="1" noRot="1" noChangeAspect="1"/>
+          </p:cNvSpPr>
+          <p:nvPr>
+            <p:ph type="sldImg"/>
+          </p:nvPr>
+        </p:nvSpPr>
+        <p:spPr/>
+      </p:sp>
+      <p:sp>
+        <p:nvSpPr>
+          <p:cNvPr id="3" name="Notes Placeholder 2"/>
+          <p:cNvSpPr>
+            <a:spLocks noGrp="1"/>
+          </p:cNvSpPr>
+          <p:nvPr>
+            <p:ph type="body" idx="1"/>
+          </p:nvPr>
+        </p:nvSpPr>
+        <p:spPr/>
+        <p:txBody>
+          <a:bodyPr/>
+          <a:lstStyle/>
+          <a:p>
+            <a:r>
+              <a:rPr lang="en-US" dirty="0" smtClean="0"/>
+              <a:t>Quite similar but not completely</a:t>
+            </a:r>
+            <a:r>
+              <a:rPr lang="en-US" baseline="0" dirty="0" smtClean="0"/>
+              <a:t> – suppose the boosting does is job</a:t>
+            </a:r>
+            <a:endParaRPr lang="en-US" dirty="0"/>
+          </a:p>
+        </p:txBody>
+      </p:sp>
+      <p:sp>
+        <p:nvSpPr>
+          <p:cNvPr id="4" name="Slide Number Placeholder 3"/>
+          <p:cNvSpPr>
+            <a:spLocks noGrp="1"/>
+          </p:cNvSpPr>
+          <p:nvPr>
+            <p:ph type="sldNum" sz="quarter" idx="10"/>
+          </p:nvPr>
+        </p:nvSpPr>
+        <p:spPr/>
+        <p:txBody>
+          <a:bodyPr/>
+          <a:lstStyle/>
+          <a:p>
+            <a:fld id="{33EFAA6C-2AC7-4B7E-83E0-5928ADC34D0B}" type="slidenum">
+              <a:rPr lang="cs-CZ" smtClean="0"/>
+              <a:pPr/>
+              <a:t>14</a:t>
+            </a:fld>
+            <a:endParaRPr lang="cs-CZ"/>
+          </a:p>
+        </p:txBody>
+      </p:sp>
+    </p:spTree>
+    <p:extLst>
+      <p:ext uri="{BB962C8B-B14F-4D97-AF65-F5344CB8AC3E}">
+        <p14:creationId xmlns:p14="http://schemas.microsoft.com/office/powerpoint/2010/main" val="3932974273"/>
+      </p:ext>
+    </p:extLst>
+  </p:cSld>
+  <p:clrMapOvr>
+    <a:masterClrMapping/>
+  </p:clrMapOvr>
+</p:notes>
+</file>
+
+<file path=ppt/notesSlides/notesSlide12.xml><?xml version="1.0" encoding="utf-8"?>
+<p:notes xmlns:a="http://schemas.openxmlformats.org/drawingml/2006/main" xmlns:r="http://schemas.openxmlformats.org/officeDocument/2006/relationships" xmlns:p="http://schemas.openxmlformats.org/presentationml/2006/main">
+  <p:cSld>
+    <p:spTree>
+      <p:nvGrpSpPr>
+        <p:cNvPr id="1" name=""/>
+        <p:cNvGrpSpPr/>
+        <p:nvPr/>
+      </p:nvGrpSpPr>
+      <p:grpSpPr>
+        <a:xfrm>
+          <a:off x="0" y="0"/>
+          <a:ext cx="0" cy="0"/>
+          <a:chOff x="0" y="0"/>
+          <a:chExt cx="0" cy="0"/>
+        </a:xfrm>
+      </p:grpSpPr>
+      <p:sp>
+        <p:nvSpPr>
+          <p:cNvPr id="2" name="Slide Image Placeholder 1"/>
+          <p:cNvSpPr>
+            <a:spLocks noGrp="1" noRot="1" noChangeAspect="1"/>
+          </p:cNvSpPr>
+          <p:nvPr>
+            <p:ph type="sldImg"/>
+          </p:nvPr>
+        </p:nvSpPr>
+        <p:spPr/>
+      </p:sp>
+      <p:sp>
+        <p:nvSpPr>
+          <p:cNvPr id="3" name="Notes Placeholder 2"/>
+          <p:cNvSpPr>
+            <a:spLocks noGrp="1"/>
+          </p:cNvSpPr>
+          <p:nvPr>
+            <p:ph type="body" idx="1"/>
+          </p:nvPr>
+        </p:nvSpPr>
+        <p:spPr/>
+        <p:txBody>
+          <a:bodyPr/>
+          <a:lstStyle/>
+          <a:p>
+            <a:r>
+              <a:rPr lang="en-US" dirty="0" smtClean="0"/>
+              <a:t>Profile</a:t>
+            </a:r>
+            <a:r>
+              <a:rPr lang="en-US" baseline="0" dirty="0" smtClean="0"/>
+              <a:t> makes up a significant chunk of the Combined list, but the added drinks from Description method prove useful – since Combined won</a:t>
+            </a:r>
+            <a:endParaRPr lang="en-US" dirty="0"/>
+          </a:p>
+        </p:txBody>
+      </p:sp>
+      <p:sp>
+        <p:nvSpPr>
+          <p:cNvPr id="4" name="Slide Number Placeholder 3"/>
+          <p:cNvSpPr>
+            <a:spLocks noGrp="1"/>
+          </p:cNvSpPr>
+          <p:nvPr>
+            <p:ph type="sldNum" sz="quarter" idx="10"/>
+          </p:nvPr>
+        </p:nvSpPr>
+        <p:spPr/>
+        <p:txBody>
+          <a:bodyPr/>
+          <a:lstStyle/>
+          <a:p>
+            <a:fld id="{33EFAA6C-2AC7-4B7E-83E0-5928ADC34D0B}" type="slidenum">
+              <a:rPr lang="cs-CZ" smtClean="0"/>
+              <a:pPr/>
+              <a:t>15</a:t>
+            </a:fld>
+            <a:endParaRPr lang="cs-CZ"/>
+          </a:p>
+        </p:txBody>
+      </p:sp>
+    </p:spTree>
+    <p:extLst>
+      <p:ext uri="{BB962C8B-B14F-4D97-AF65-F5344CB8AC3E}">
+        <p14:creationId xmlns:p14="http://schemas.microsoft.com/office/powerpoint/2010/main" val="3681991776"/>
+      </p:ext>
+    </p:extLst>
+  </p:cSld>
+  <p:clrMapOvr>
+    <a:masterClrMapping/>
+  </p:clrMapOvr>
+</p:notes>
+</file>
+
 <file path=ppt/notesSlides/notesSlide2.xml><?xml version="1.0" encoding="utf-8"?>
 <p:notes xmlns:a="http://schemas.openxmlformats.org/drawingml/2006/main" xmlns:r="http://schemas.openxmlformats.org/officeDocument/2006/relationships" xmlns:p="http://schemas.openxmlformats.org/presentationml/2006/main">
   <p:cSld>
@@ -1087,7 +1364,23 @@
             </a:r>
             <a:r>
               <a:rPr lang="en-US" baseline="0" dirty="0" smtClean="0"/>
-              <a:t> pick up onto unusual similarities – same book, same series of drinks .. First problem – some drinks were missing descriptions … Another – descriptions mention unrelated drinks</a:t>
+              <a:t> pick up onto unusual similarities – same book, same series of </a:t>
+            </a:r>
+            <a:r>
+              <a:rPr lang="en-US" baseline="0" dirty="0" smtClean="0"/>
+              <a:t>drinks, city of origin </a:t>
+            </a:r>
+            <a:r>
+              <a:rPr lang="en-US" baseline="0" dirty="0" smtClean="0"/>
+              <a:t>.. </a:t>
+            </a:r>
+            <a:r>
+              <a:rPr lang="en-US" baseline="0" dirty="0" smtClean="0"/>
+              <a:t>Recipe description mentions ingredients .. First </a:t>
+            </a:r>
+            <a:r>
+              <a:rPr lang="en-US" baseline="0" dirty="0" smtClean="0"/>
+              <a:t>problem – some drinks were missing descriptions … Another – descriptions mention unrelated drinks</a:t>
             </a:r>
             <a:endParaRPr lang="en-US" dirty="0"/>
           </a:p>
@@ -1176,7 +1469,11 @@
           <a:p>
             <a:r>
               <a:rPr lang="en-US" dirty="0" smtClean="0"/>
-              <a:t>Combined keywords from both .. Good mix od very similar items with items similar on some unusual way … sometimes though bad items bubble through</a:t>
+              <a:t>Combined keywords from both .. Good mix od very similar items with items similar on some unusual way … sometimes though bad items bubble </a:t>
+            </a:r>
+            <a:r>
+              <a:rPr lang="en-US" dirty="0" smtClean="0"/>
+              <a:t>through</a:t>
             </a:r>
             <a:endParaRPr lang="en-US" dirty="0"/>
           </a:p>
@@ -1269,7 +1566,11 @@
             </a:r>
             <a:r>
               <a:rPr lang="en-US" baseline="0" dirty="0" smtClean="0"/>
-              <a:t> be more similar in the ‘right’ categories</a:t>
+              <a:t> be more similar in the ‘right’ </a:t>
+            </a:r>
+            <a:r>
+              <a:rPr lang="en-US" baseline="0" dirty="0" smtClean="0"/>
+              <a:t>categories – similarity on important categories.</a:t>
             </a:r>
             <a:endParaRPr lang="en-US" dirty="0"/>
           </a:p>
@@ -1303,6 +1604,204 @@
     <p:extLst>
       <p:ext uri="{BB962C8B-B14F-4D97-AF65-F5344CB8AC3E}">
         <p14:creationId xmlns:p14="http://schemas.microsoft.com/office/powerpoint/2010/main" val="3739447310"/>
+      </p:ext>
+    </p:extLst>
+  </p:cSld>
+  <p:clrMapOvr>
+    <a:masterClrMapping/>
+  </p:clrMapOvr>
+</p:notes>
+</file>
+
+<file path=ppt/notesSlides/notesSlide8.xml><?xml version="1.0" encoding="utf-8"?>
+<p:notes xmlns:a="http://schemas.openxmlformats.org/drawingml/2006/main" xmlns:r="http://schemas.openxmlformats.org/officeDocument/2006/relationships" xmlns:p="http://schemas.openxmlformats.org/presentationml/2006/main">
+  <p:cSld>
+    <p:spTree>
+      <p:nvGrpSpPr>
+        <p:cNvPr id="1" name=""/>
+        <p:cNvGrpSpPr/>
+        <p:nvPr/>
+      </p:nvGrpSpPr>
+      <p:grpSpPr>
+        <a:xfrm>
+          <a:off x="0" y="0"/>
+          <a:ext cx="0" cy="0"/>
+          <a:chOff x="0" y="0"/>
+          <a:chExt cx="0" cy="0"/>
+        </a:xfrm>
+      </p:grpSpPr>
+      <p:sp>
+        <p:nvSpPr>
+          <p:cNvPr id="2" name="Slide Image Placeholder 1"/>
+          <p:cNvSpPr>
+            <a:spLocks noGrp="1" noRot="1" noChangeAspect="1"/>
+          </p:cNvSpPr>
+          <p:nvPr>
+            <p:ph type="sldImg"/>
+          </p:nvPr>
+        </p:nvSpPr>
+        <p:spPr/>
+      </p:sp>
+      <p:sp>
+        <p:nvSpPr>
+          <p:cNvPr id="3" name="Notes Placeholder 2"/>
+          <p:cNvSpPr>
+            <a:spLocks noGrp="1"/>
+          </p:cNvSpPr>
+          <p:nvPr>
+            <p:ph type="body" idx="1"/>
+          </p:nvPr>
+        </p:nvSpPr>
+        <p:spPr/>
+        <p:txBody>
+          <a:bodyPr/>
+          <a:lstStyle/>
+          <a:p>
+            <a:r>
+              <a:rPr lang="en-US" dirty="0" smtClean="0"/>
+              <a:t>Randomly chosen</a:t>
+            </a:r>
+            <a:r>
+              <a:rPr lang="en-US" baseline="0" dirty="0" smtClean="0"/>
+              <a:t> drinks, 5 rows in random order corresponding to the methods, each with 3 drinks – selected best row gains a point</a:t>
+            </a:r>
+          </a:p>
+          <a:p>
+            <a:r>
+              <a:rPr lang="en-US" baseline="0" dirty="0" smtClean="0"/>
+              <a:t>Basic description and ingredients to help with choosing, still takes quite a lot of time</a:t>
+            </a:r>
+            <a:endParaRPr lang="en-US" dirty="0"/>
+          </a:p>
+        </p:txBody>
+      </p:sp>
+      <p:sp>
+        <p:nvSpPr>
+          <p:cNvPr id="4" name="Slide Number Placeholder 3"/>
+          <p:cNvSpPr>
+            <a:spLocks noGrp="1"/>
+          </p:cNvSpPr>
+          <p:nvPr>
+            <p:ph type="sldNum" sz="quarter" idx="10"/>
+          </p:nvPr>
+        </p:nvSpPr>
+        <p:spPr/>
+        <p:txBody>
+          <a:bodyPr/>
+          <a:lstStyle/>
+          <a:p>
+            <a:fld id="{33EFAA6C-2AC7-4B7E-83E0-5928ADC34D0B}" type="slidenum">
+              <a:rPr lang="cs-CZ" smtClean="0"/>
+              <a:pPr/>
+              <a:t>11</a:t>
+            </a:fld>
+            <a:endParaRPr lang="cs-CZ"/>
+          </a:p>
+        </p:txBody>
+      </p:sp>
+    </p:spTree>
+    <p:extLst>
+      <p:ext uri="{BB962C8B-B14F-4D97-AF65-F5344CB8AC3E}">
+        <p14:creationId xmlns:p14="http://schemas.microsoft.com/office/powerpoint/2010/main" val="987463190"/>
+      </p:ext>
+    </p:extLst>
+  </p:cSld>
+  <p:clrMapOvr>
+    <a:masterClrMapping/>
+  </p:clrMapOvr>
+</p:notes>
+</file>
+
+<file path=ppt/notesSlides/notesSlide9.xml><?xml version="1.0" encoding="utf-8"?>
+<p:notes xmlns:a="http://schemas.openxmlformats.org/drawingml/2006/main" xmlns:r="http://schemas.openxmlformats.org/officeDocument/2006/relationships" xmlns:p="http://schemas.openxmlformats.org/presentationml/2006/main">
+  <p:cSld>
+    <p:spTree>
+      <p:nvGrpSpPr>
+        <p:cNvPr id="1" name=""/>
+        <p:cNvGrpSpPr/>
+        <p:nvPr/>
+      </p:nvGrpSpPr>
+      <p:grpSpPr>
+        <a:xfrm>
+          <a:off x="0" y="0"/>
+          <a:ext cx="0" cy="0"/>
+          <a:chOff x="0" y="0"/>
+          <a:chExt cx="0" cy="0"/>
+        </a:xfrm>
+      </p:grpSpPr>
+      <p:sp>
+        <p:nvSpPr>
+          <p:cNvPr id="2" name="Slide Image Placeholder 1"/>
+          <p:cNvSpPr>
+            <a:spLocks noGrp="1" noRot="1" noChangeAspect="1"/>
+          </p:cNvSpPr>
+          <p:nvPr>
+            <p:ph type="sldImg"/>
+          </p:nvPr>
+        </p:nvSpPr>
+        <p:spPr/>
+      </p:sp>
+      <p:sp>
+        <p:nvSpPr>
+          <p:cNvPr id="3" name="Notes Placeholder 2"/>
+          <p:cNvSpPr>
+            <a:spLocks noGrp="1"/>
+          </p:cNvSpPr>
+          <p:nvPr>
+            <p:ph type="body" idx="1"/>
+          </p:nvPr>
+        </p:nvSpPr>
+        <p:spPr/>
+        <p:txBody>
+          <a:bodyPr/>
+          <a:lstStyle/>
+          <a:p>
+            <a:r>
+              <a:rPr lang="en-US" dirty="0" smtClean="0"/>
+              <a:t>Combined</a:t>
+            </a:r>
+            <a:r>
+              <a:rPr lang="en-US" baseline="0" dirty="0" smtClean="0"/>
+              <a:t> proved to be the best, although profile based methods also did well, and they make up a large portion of the Combined list.</a:t>
+            </a:r>
+          </a:p>
+          <a:p>
+            <a:r>
+              <a:rPr lang="en-US" baseline="0" dirty="0" smtClean="0"/>
+              <a:t>Description by itself is pretty poor, but works in Combined approach – key note – drinks provided by Description usually rank pretty high in Combined list, but not completely at the top</a:t>
+            </a:r>
+            <a:endParaRPr lang="en-US" dirty="0"/>
+          </a:p>
+        </p:txBody>
+      </p:sp>
+      <p:sp>
+        <p:nvSpPr>
+          <p:cNvPr id="4" name="Slide Number Placeholder 3"/>
+          <p:cNvSpPr>
+            <a:spLocks noGrp="1"/>
+          </p:cNvSpPr>
+          <p:nvPr>
+            <p:ph type="sldNum" sz="quarter" idx="10"/>
+          </p:nvPr>
+        </p:nvSpPr>
+        <p:spPr/>
+        <p:txBody>
+          <a:bodyPr/>
+          <a:lstStyle/>
+          <a:p>
+            <a:fld id="{33EFAA6C-2AC7-4B7E-83E0-5928ADC34D0B}" type="slidenum">
+              <a:rPr lang="cs-CZ" smtClean="0"/>
+              <a:pPr/>
+              <a:t>12</a:t>
+            </a:fld>
+            <a:endParaRPr lang="cs-CZ"/>
+          </a:p>
+        </p:txBody>
+      </p:sp>
+    </p:spTree>
+    <p:extLst>
+      <p:ext uri="{BB962C8B-B14F-4D97-AF65-F5344CB8AC3E}">
+        <p14:creationId xmlns:p14="http://schemas.microsoft.com/office/powerpoint/2010/main" val="1351780396"/>
       </p:ext>
     </p:extLst>
   </p:cSld>
@@ -10766,6 +11265,13 @@
   <p:clrMapOvr>
     <a:masterClrMapping/>
   </p:clrMapOvr>
+  <p:timing>
+    <p:tnLst>
+      <p:par>
+        <p:cTn id="1" dur="indefinite" restart="never" nodeType="tmRoot"/>
+      </p:par>
+    </p:tnLst>
+  </p:timing>
 </p:sld>
 </file>
 
@@ -10837,20 +11343,34 @@
           <a:bodyPr/>
           <a:lstStyle/>
           <a:p>
-            <a:r>
-              <a:rPr lang="en-US" dirty="0" smtClean="0"/>
-              <a:t>Evaluator screenshot</a:t>
-            </a:r>
-            <a:endParaRPr lang="en-US" dirty="0"/>
-          </a:p>
-          <a:p>
-            <a:r>
-              <a:rPr lang="en-US" dirty="0" smtClean="0"/>
-              <a:t>Short Description</a:t>
-            </a:r>
-          </a:p>
-        </p:txBody>
-      </p:sp>
+            <a:endParaRPr lang="en-US" dirty="0" smtClean="0"/>
+          </a:p>
+        </p:txBody>
+      </p:sp>
+      <p:pic>
+        <p:nvPicPr>
+          <p:cNvPr id="4" name="Picture 3"/>
+          <p:cNvPicPr>
+            <a:picLocks noChangeAspect="1"/>
+          </p:cNvPicPr>
+          <p:nvPr/>
+        </p:nvPicPr>
+        <p:blipFill>
+          <a:blip r:embed="rId3"/>
+          <a:stretch>
+            <a:fillRect/>
+          </a:stretch>
+        </p:blipFill>
+        <p:spPr>
+          <a:xfrm>
+            <a:off x="516158" y="1484785"/>
+            <a:ext cx="8111683" cy="4968592"/>
+          </a:xfrm>
+          <a:prstGeom prst="rect">
+            <a:avLst/>
+          </a:prstGeom>
+        </p:spPr>
+      </p:pic>
     </p:spTree>
     <p:extLst>
       <p:ext uri="{BB962C8B-B14F-4D97-AF65-F5344CB8AC3E}">
@@ -10861,6 +11381,13 @@
   <p:clrMapOvr>
     <a:masterClrMapping/>
   </p:clrMapOvr>
+  <p:timing>
+    <p:tnLst>
+      <p:par>
+        <p:cTn id="1" dur="indefinite" restart="never" nodeType="tmRoot"/>
+      </p:par>
+    </p:tnLst>
+  </p:timing>
 </p:sld>
 </file>
 
@@ -10912,34 +11439,35 @@
           </a:p>
         </p:txBody>
       </p:sp>
-      <p:sp>
-        <p:nvSpPr>
-          <p:cNvPr id="3" name="Content Placeholder 2"/>
-          <p:cNvSpPr>
-            <a:spLocks noGrp="1"/>
-          </p:cNvSpPr>
+      <p:pic>
+        <p:nvPicPr>
+          <p:cNvPr id="7" name="Content Placeholder 6"/>
+          <p:cNvPicPr>
+            <a:picLocks noGrp="1" noChangeAspect="1"/>
+          </p:cNvPicPr>
           <p:nvPr>
             <p:ph idx="1"/>
           </p:nvPr>
-        </p:nvSpPr>
+        </p:nvPicPr>
+        <p:blipFill>
+          <a:blip r:embed="rId3">
+            <a:extLst>
+              <a:ext uri="{28A0092B-C50C-407E-A947-70E740481C1C}">
+                <a14:useLocalDpi xmlns:a14="http://schemas.microsoft.com/office/drawing/2010/main" val="0"/>
+              </a:ext>
+            </a:extLst>
+          </a:blip>
+          <a:stretch>
+            <a:fillRect/>
+          </a:stretch>
+        </p:blipFill>
         <p:spPr>
           <a:xfrm>
-            <a:off x="914400" y="1484785"/>
-            <a:ext cx="7315200" cy="4824576"/>
+            <a:off x="1191350" y="913464"/>
+            <a:ext cx="6761300" cy="5916138"/>
           </a:xfrm>
         </p:spPr>
-        <p:txBody>
-          <a:bodyPr/>
-          <a:lstStyle/>
-          <a:p>
-            <a:r>
-              <a:rPr lang="en-US" dirty="0" smtClean="0"/>
-              <a:t>Graph of the evaluation results + commentary about it</a:t>
-            </a:r>
-            <a:endParaRPr lang="cs-CZ" dirty="0"/>
-          </a:p>
-        </p:txBody>
-      </p:sp>
+      </p:pic>
     </p:spTree>
     <p:extLst>
       <p:ext uri="{BB962C8B-B14F-4D97-AF65-F5344CB8AC3E}">
@@ -10950,6 +11478,13 @@
   <p:clrMapOvr>
     <a:masterClrMapping/>
   </p:clrMapOvr>
+  <p:timing>
+    <p:tnLst>
+      <p:par>
+        <p:cTn id="1" dur="indefinite" restart="never" nodeType="tmRoot"/>
+      </p:par>
+    </p:tnLst>
+  </p:timing>
 </p:sld>
 </file>
 
@@ -10988,73 +11523,112 @@
         </p:spPr>
         <p:txBody>
           <a:bodyPr>
-            <a:normAutofit/>
+            <a:normAutofit fontScale="90000"/>
           </a:bodyPr>
           <a:lstStyle/>
           <a:p>
             <a:pPr algn="ctr"/>
             <a:r>
+              <a:rPr lang="en-US" sz="3200" dirty="0"/>
+              <a:t>Profile vs </a:t>
+            </a:r>
+            <a:r>
               <a:rPr lang="en-US" sz="3200" dirty="0" smtClean="0"/>
-              <a:t>Evaluation</a:t>
+              <a:t>Description</a:t>
             </a:r>
             <a:endParaRPr lang="cs-CZ" sz="3200" dirty="0"/>
           </a:p>
         </p:txBody>
       </p:sp>
-      <p:sp>
-        <p:nvSpPr>
-          <p:cNvPr id="3" name="Content Placeholder 2"/>
-          <p:cNvSpPr>
-            <a:spLocks noGrp="1"/>
-          </p:cNvSpPr>
+      <p:pic>
+        <p:nvPicPr>
+          <p:cNvPr id="4" name="Content Placeholder 3"/>
+          <p:cNvPicPr>
+            <a:picLocks noGrp="1" noChangeAspect="1"/>
+          </p:cNvPicPr>
           <p:nvPr>
             <p:ph idx="1"/>
           </p:nvPr>
-        </p:nvSpPr>
+        </p:nvPicPr>
+        <p:blipFill>
+          <a:blip r:embed="rId3">
+            <a:extLst>
+              <a:ext uri="{28A0092B-C50C-407E-A947-70E740481C1C}">
+                <a14:useLocalDpi xmlns:a14="http://schemas.microsoft.com/office/drawing/2010/main" val="0"/>
+              </a:ext>
+            </a:extLst>
+          </a:blip>
+          <a:stretch>
+            <a:fillRect/>
+          </a:stretch>
+        </p:blipFill>
         <p:spPr>
           <a:xfrm>
-            <a:off x="914400" y="1484785"/>
-            <a:ext cx="7315200" cy="4824576"/>
+            <a:off x="298256" y="1018175"/>
+            <a:ext cx="3794959" cy="2846219"/>
           </a:xfrm>
         </p:spPr>
-        <p:txBody>
-          <a:bodyPr/>
-          <a:lstStyle/>
-          <a:p>
-            <a:r>
-              <a:rPr lang="en-US" dirty="0" smtClean="0"/>
-              <a:t>Graphs about how different are the sets produce by selected methods ?</a:t>
-            </a:r>
-          </a:p>
-          <a:p>
-            <a:r>
-              <a:rPr lang="en-US" dirty="0" smtClean="0"/>
-              <a:t>Profile vs Description</a:t>
-            </a:r>
-          </a:p>
-          <a:p>
-            <a:r>
-              <a:rPr lang="en-US" dirty="0" smtClean="0"/>
-              <a:t>Boosted </a:t>
-            </a:r>
-            <a:r>
-              <a:rPr lang="en-US" dirty="0"/>
-              <a:t>P</a:t>
-            </a:r>
-            <a:r>
-              <a:rPr lang="en-US" dirty="0" smtClean="0"/>
-              <a:t>rofile vs Profile</a:t>
-            </a:r>
-          </a:p>
-          <a:p>
-            <a:r>
-              <a:rPr lang="en-US" dirty="0" smtClean="0"/>
-              <a:t>Profile vs Combined</a:t>
-            </a:r>
-            <a:endParaRPr lang="cs-CZ" dirty="0"/>
-          </a:p>
-        </p:txBody>
-      </p:sp>
+      </p:pic>
+      <p:pic>
+        <p:nvPicPr>
+          <p:cNvPr id="5" name="Picture 4"/>
+          <p:cNvPicPr>
+            <a:picLocks noChangeAspect="1"/>
+          </p:cNvPicPr>
+          <p:nvPr/>
+        </p:nvPicPr>
+        <p:blipFill>
+          <a:blip r:embed="rId4">
+            <a:extLst>
+              <a:ext uri="{28A0092B-C50C-407E-A947-70E740481C1C}">
+                <a14:useLocalDpi xmlns:a14="http://schemas.microsoft.com/office/drawing/2010/main" val="0"/>
+              </a:ext>
+            </a:extLst>
+          </a:blip>
+          <a:stretch>
+            <a:fillRect/>
+          </a:stretch>
+        </p:blipFill>
+        <p:spPr>
+          <a:xfrm>
+            <a:off x="2267744" y="3988682"/>
+            <a:ext cx="3766258" cy="2824694"/>
+          </a:xfrm>
+          <a:prstGeom prst="rect">
+            <a:avLst/>
+          </a:prstGeom>
+        </p:spPr>
+      </p:pic>
+      <p:pic>
+        <p:nvPicPr>
+          <p:cNvPr id="6" name="Picture 5"/>
+          <p:cNvPicPr>
+            <a:picLocks noChangeAspect="1"/>
+          </p:cNvPicPr>
+          <p:nvPr/>
+        </p:nvPicPr>
+        <p:blipFill>
+          <a:blip r:embed="rId5">
+            <a:extLst>
+              <a:ext uri="{28A0092B-C50C-407E-A947-70E740481C1C}">
+                <a14:useLocalDpi xmlns:a14="http://schemas.microsoft.com/office/drawing/2010/main" val="0"/>
+              </a:ext>
+            </a:extLst>
+          </a:blip>
+          <a:stretch>
+            <a:fillRect/>
+          </a:stretch>
+        </p:blipFill>
+        <p:spPr>
+          <a:xfrm>
+            <a:off x="4258453" y="1018175"/>
+            <a:ext cx="3794959" cy="2846219"/>
+          </a:xfrm>
+          <a:prstGeom prst="rect">
+            <a:avLst/>
+          </a:prstGeom>
+        </p:spPr>
+      </p:pic>
     </p:spTree>
     <p:extLst>
       <p:ext uri="{BB962C8B-B14F-4D97-AF65-F5344CB8AC3E}">
@@ -11065,10 +11639,335 @@
   <p:clrMapOvr>
     <a:masterClrMapping/>
   </p:clrMapOvr>
+  <p:timing>
+    <p:tnLst>
+      <p:par>
+        <p:cTn id="1" dur="indefinite" restart="never" nodeType="tmRoot"/>
+      </p:par>
+    </p:tnLst>
+  </p:timing>
 </p:sld>
 </file>
 
 <file path=ppt/slides/slide14.xml><?xml version="1.0" encoding="utf-8"?>
+<p:sld xmlns:a="http://schemas.openxmlformats.org/drawingml/2006/main" xmlns:r="http://schemas.openxmlformats.org/officeDocument/2006/relationships" xmlns:p="http://schemas.openxmlformats.org/presentationml/2006/main">
+  <p:cSld>
+    <p:spTree>
+      <p:nvGrpSpPr>
+        <p:cNvPr id="1" name=""/>
+        <p:cNvGrpSpPr/>
+        <p:nvPr/>
+      </p:nvGrpSpPr>
+      <p:grpSpPr>
+        <a:xfrm>
+          <a:off x="0" y="0"/>
+          <a:ext cx="0" cy="0"/>
+          <a:chOff x="0" y="0"/>
+          <a:chExt cx="0" cy="0"/>
+        </a:xfrm>
+      </p:grpSpPr>
+      <p:sp>
+        <p:nvSpPr>
+          <p:cNvPr id="2" name="Title 1"/>
+          <p:cNvSpPr>
+            <a:spLocks noGrp="1"/>
+          </p:cNvSpPr>
+          <p:nvPr>
+            <p:ph type="title"/>
+          </p:nvPr>
+        </p:nvSpPr>
+        <p:spPr>
+          <a:xfrm>
+            <a:off x="2235442" y="404664"/>
+            <a:ext cx="4673116" cy="588141"/>
+          </a:xfrm>
+        </p:spPr>
+        <p:txBody>
+          <a:bodyPr>
+            <a:normAutofit fontScale="90000"/>
+          </a:bodyPr>
+          <a:lstStyle/>
+          <a:p>
+            <a:pPr algn="ctr"/>
+            <a:r>
+              <a:rPr lang="en-US" sz="3200" dirty="0"/>
+              <a:t>Boosted Profile vs </a:t>
+            </a:r>
+            <a:r>
+              <a:rPr lang="en-US" sz="3200" dirty="0" smtClean="0"/>
+              <a:t>Profile</a:t>
+            </a:r>
+            <a:endParaRPr lang="cs-CZ" sz="3200" dirty="0"/>
+          </a:p>
+        </p:txBody>
+      </p:sp>
+      <p:pic>
+        <p:nvPicPr>
+          <p:cNvPr id="4" name="Content Placeholder 3"/>
+          <p:cNvPicPr>
+            <a:picLocks noGrp="1" noChangeAspect="1"/>
+          </p:cNvPicPr>
+          <p:nvPr>
+            <p:ph idx="1"/>
+          </p:nvPr>
+        </p:nvPicPr>
+        <p:blipFill>
+          <a:blip r:embed="rId3">
+            <a:extLst>
+              <a:ext uri="{28A0092B-C50C-407E-A947-70E740481C1C}">
+                <a14:useLocalDpi xmlns:a14="http://schemas.microsoft.com/office/drawing/2010/main" val="0"/>
+              </a:ext>
+            </a:extLst>
+          </a:blip>
+          <a:stretch>
+            <a:fillRect/>
+          </a:stretch>
+        </p:blipFill>
+        <p:spPr>
+          <a:xfrm>
+            <a:off x="323528" y="1035703"/>
+            <a:ext cx="3767127" cy="2825345"/>
+          </a:xfrm>
+        </p:spPr>
+      </p:pic>
+      <p:pic>
+        <p:nvPicPr>
+          <p:cNvPr id="5" name="Picture 4"/>
+          <p:cNvPicPr>
+            <a:picLocks noChangeAspect="1"/>
+          </p:cNvPicPr>
+          <p:nvPr/>
+        </p:nvPicPr>
+        <p:blipFill>
+          <a:blip r:embed="rId4">
+            <a:extLst>
+              <a:ext uri="{28A0092B-C50C-407E-A947-70E740481C1C}">
+                <a14:useLocalDpi xmlns:a14="http://schemas.microsoft.com/office/drawing/2010/main" val="0"/>
+              </a:ext>
+            </a:extLst>
+          </a:blip>
+          <a:stretch>
+            <a:fillRect/>
+          </a:stretch>
+        </p:blipFill>
+        <p:spPr>
+          <a:xfrm>
+            <a:off x="2267744" y="3988031"/>
+            <a:ext cx="3767127" cy="2825345"/>
+          </a:xfrm>
+          <a:prstGeom prst="rect">
+            <a:avLst/>
+          </a:prstGeom>
+        </p:spPr>
+      </p:pic>
+      <p:pic>
+        <p:nvPicPr>
+          <p:cNvPr id="6" name="Picture 5"/>
+          <p:cNvPicPr>
+            <a:picLocks noChangeAspect="1"/>
+          </p:cNvPicPr>
+          <p:nvPr/>
+        </p:nvPicPr>
+        <p:blipFill>
+          <a:blip r:embed="rId5">
+            <a:extLst>
+              <a:ext uri="{28A0092B-C50C-407E-A947-70E740481C1C}">
+                <a14:useLocalDpi xmlns:a14="http://schemas.microsoft.com/office/drawing/2010/main" val="0"/>
+              </a:ext>
+            </a:extLst>
+          </a:blip>
+          <a:stretch>
+            <a:fillRect/>
+          </a:stretch>
+        </p:blipFill>
+        <p:spPr>
+          <a:xfrm>
+            <a:off x="4261257" y="1035703"/>
+            <a:ext cx="3767127" cy="2825345"/>
+          </a:xfrm>
+          <a:prstGeom prst="rect">
+            <a:avLst/>
+          </a:prstGeom>
+        </p:spPr>
+      </p:pic>
+    </p:spTree>
+    <p:extLst>
+      <p:ext uri="{BB962C8B-B14F-4D97-AF65-F5344CB8AC3E}">
+        <p14:creationId xmlns:p14="http://schemas.microsoft.com/office/powerpoint/2010/main" val="1755259177"/>
+      </p:ext>
+    </p:extLst>
+  </p:cSld>
+  <p:clrMapOvr>
+    <a:masterClrMapping/>
+  </p:clrMapOvr>
+  <p:timing>
+    <p:tnLst>
+      <p:par>
+        <p:cTn id="1" dur="indefinite" restart="never" nodeType="tmRoot"/>
+      </p:par>
+    </p:tnLst>
+  </p:timing>
+</p:sld>
+</file>
+
+<file path=ppt/slides/slide15.xml><?xml version="1.0" encoding="utf-8"?>
+<p:sld xmlns:a="http://schemas.openxmlformats.org/drawingml/2006/main" xmlns:r="http://schemas.openxmlformats.org/officeDocument/2006/relationships" xmlns:p="http://schemas.openxmlformats.org/presentationml/2006/main">
+  <p:cSld>
+    <p:spTree>
+      <p:nvGrpSpPr>
+        <p:cNvPr id="1" name=""/>
+        <p:cNvGrpSpPr/>
+        <p:nvPr/>
+      </p:nvGrpSpPr>
+      <p:grpSpPr>
+        <a:xfrm>
+          <a:off x="0" y="0"/>
+          <a:ext cx="0" cy="0"/>
+          <a:chOff x="0" y="0"/>
+          <a:chExt cx="0" cy="0"/>
+        </a:xfrm>
+      </p:grpSpPr>
+      <p:sp>
+        <p:nvSpPr>
+          <p:cNvPr id="2" name="Title 1"/>
+          <p:cNvSpPr>
+            <a:spLocks noGrp="1"/>
+          </p:cNvSpPr>
+          <p:nvPr>
+            <p:ph type="title"/>
+          </p:nvPr>
+        </p:nvSpPr>
+        <p:spPr>
+          <a:xfrm>
+            <a:off x="2707196" y="392587"/>
+            <a:ext cx="3729608" cy="588141"/>
+          </a:xfrm>
+        </p:spPr>
+        <p:txBody>
+          <a:bodyPr>
+            <a:normAutofit fontScale="90000"/>
+          </a:bodyPr>
+          <a:lstStyle/>
+          <a:p>
+            <a:pPr algn="ctr"/>
+            <a:r>
+              <a:rPr lang="en-US" sz="3200" dirty="0"/>
+              <a:t>Profile vs Combined</a:t>
+            </a:r>
+            <a:endParaRPr lang="cs-CZ" sz="3200" dirty="0"/>
+          </a:p>
+        </p:txBody>
+      </p:sp>
+      <p:pic>
+        <p:nvPicPr>
+          <p:cNvPr id="4" name="Content Placeholder 3"/>
+          <p:cNvPicPr>
+            <a:picLocks noGrp="1" noChangeAspect="1"/>
+          </p:cNvPicPr>
+          <p:nvPr>
+            <p:ph idx="1"/>
+          </p:nvPr>
+        </p:nvPicPr>
+        <p:blipFill>
+          <a:blip r:embed="rId3">
+            <a:extLst>
+              <a:ext uri="{28A0092B-C50C-407E-A947-70E740481C1C}">
+                <a14:useLocalDpi xmlns:a14="http://schemas.microsoft.com/office/drawing/2010/main" val="0"/>
+              </a:ext>
+            </a:extLst>
+          </a:blip>
+          <a:stretch>
+            <a:fillRect/>
+          </a:stretch>
+        </p:blipFill>
+        <p:spPr>
+          <a:xfrm>
+            <a:off x="323527" y="998730"/>
+            <a:ext cx="3826155" cy="2869616"/>
+          </a:xfrm>
+        </p:spPr>
+      </p:pic>
+      <p:pic>
+        <p:nvPicPr>
+          <p:cNvPr id="5" name="Picture 4"/>
+          <p:cNvPicPr>
+            <a:picLocks noChangeAspect="1"/>
+          </p:cNvPicPr>
+          <p:nvPr/>
+        </p:nvPicPr>
+        <p:blipFill>
+          <a:blip r:embed="rId4">
+            <a:extLst>
+              <a:ext uri="{28A0092B-C50C-407E-A947-70E740481C1C}">
+                <a14:useLocalDpi xmlns:a14="http://schemas.microsoft.com/office/drawing/2010/main" val="0"/>
+              </a:ext>
+            </a:extLst>
+          </a:blip>
+          <a:stretch>
+            <a:fillRect/>
+          </a:stretch>
+        </p:blipFill>
+        <p:spPr>
+          <a:xfrm>
+            <a:off x="2267743" y="3943761"/>
+            <a:ext cx="3826155" cy="2869616"/>
+          </a:xfrm>
+          <a:prstGeom prst="rect">
+            <a:avLst/>
+          </a:prstGeom>
+        </p:spPr>
+      </p:pic>
+      <p:pic>
+        <p:nvPicPr>
+          <p:cNvPr id="6" name="Picture 5"/>
+          <p:cNvPicPr>
+            <a:picLocks noChangeAspect="1"/>
+          </p:cNvPicPr>
+          <p:nvPr/>
+        </p:nvPicPr>
+        <p:blipFill>
+          <a:blip r:embed="rId5">
+            <a:extLst>
+              <a:ext uri="{28A0092B-C50C-407E-A947-70E740481C1C}">
+                <a14:useLocalDpi xmlns:a14="http://schemas.microsoft.com/office/drawing/2010/main" val="0"/>
+              </a:ext>
+            </a:extLst>
+          </a:blip>
+          <a:stretch>
+            <a:fillRect/>
+          </a:stretch>
+        </p:blipFill>
+        <p:spPr>
+          <a:xfrm>
+            <a:off x="4274237" y="998730"/>
+            <a:ext cx="3826155" cy="2869616"/>
+          </a:xfrm>
+          <a:prstGeom prst="rect">
+            <a:avLst/>
+          </a:prstGeom>
+        </p:spPr>
+      </p:pic>
+    </p:spTree>
+    <p:extLst>
+      <p:ext uri="{BB962C8B-B14F-4D97-AF65-F5344CB8AC3E}">
+        <p14:creationId xmlns:p14="http://schemas.microsoft.com/office/powerpoint/2010/main" val="429966874"/>
+      </p:ext>
+    </p:extLst>
+  </p:cSld>
+  <p:clrMapOvr>
+    <a:masterClrMapping/>
+  </p:clrMapOvr>
+  <p:timing>
+    <p:tnLst>
+      <p:par>
+        <p:cTn id="1" dur="indefinite" restart="never" nodeType="tmRoot"/>
+      </p:par>
+    </p:tnLst>
+  </p:timing>
+</p:sld>
+</file>
+
+<file path=ppt/slides/slide16.xml><?xml version="1.0" encoding="utf-8"?>
 <p:sld xmlns:a="http://schemas.openxmlformats.org/drawingml/2006/main" xmlns:r="http://schemas.openxmlformats.org/officeDocument/2006/relationships" xmlns:p="http://schemas.openxmlformats.org/presentationml/2006/main">
   <p:cSld>
     <p:spTree>
@@ -11861,8 +12760,13 @@
           <a:p>
             <a:r>
               <a:rPr lang="en-US" dirty="0" smtClean="0"/>
-              <a:t>Content-Based (TF-IDF)</a:t>
-            </a:r>
+              <a:t>Content-Based (</a:t>
+            </a:r>
+            <a:r>
+              <a:rPr lang="en-US" dirty="0" smtClean="0"/>
+              <a:t>TF-IDF, cosine similarity)</a:t>
+            </a:r>
+            <a:endParaRPr lang="en-US" dirty="0" smtClean="0"/>
           </a:p>
           <a:p>
             <a:endParaRPr lang="en-US" dirty="0" smtClean="0"/>
@@ -12508,7 +13412,15 @@
           <a:p>
             <a:r>
               <a:rPr lang="en-US" dirty="0" smtClean="0"/>
-              <a:t>Sometimes unrelated results appear</a:t>
+              <a:t>Poorer </a:t>
+            </a:r>
+            <a:r>
+              <a:rPr lang="en-US" dirty="0" smtClean="0"/>
+              <a:t>results still </a:t>
+            </a:r>
+            <a:r>
+              <a:rPr lang="en-US" smtClean="0"/>
+              <a:t>appear sometimes</a:t>
             </a:r>
             <a:endParaRPr lang="cs-CZ" dirty="0"/>
           </a:p>

</xml_diff>